<commit_message>
Fix typo in diagram
</commit_message>
<xml_diff>
--- a/Coalesce Diagrams.pptx
+++ b/Coalesce Diagrams.pptx
@@ -173,7 +173,7 @@
           </a:lstStyle>
           <a:p>
             <a:r>
-              <a:rPr lang="en-US" smtClean="0"/>
+              <a:rPr lang="en-US"/>
               <a:t>Click to edit Master title style</a:t>
             </a:r>
             <a:endParaRPr lang="en-US" dirty="0"/>
@@ -303,7 +303,7 @@
           </a:lstStyle>
           <a:p>
             <a:r>
-              <a:rPr lang="en-US" smtClean="0"/>
+              <a:rPr lang="en-US"/>
               <a:t>Click to edit Master subtitle style</a:t>
             </a:r>
             <a:endParaRPr lang="en-US" dirty="0"/>
@@ -327,7 +327,7 @@
           <a:p>
             <a:fld id="{64BF311C-CCA0-4B11-AF0A-CF55FF4C099E}" type="datetimeFigureOut">
               <a:rPr lang="en-US" smtClean="0"/>
-              <a:t>12/16/2015</a:t>
+              <a:t>7/22/2016</a:t>
             </a:fld>
             <a:endParaRPr lang="en-US"/>
           </a:p>
@@ -432,7 +432,7 @@
           </a:lstStyle>
           <a:p>
             <a:r>
-              <a:rPr lang="en-US" smtClean="0"/>
+              <a:rPr lang="en-US"/>
               <a:t>Click to edit Master title style</a:t>
             </a:r>
             <a:endParaRPr lang="en-US" dirty="0"/>
@@ -527,7 +527,7 @@
           </a:lstStyle>
           <a:p>
             <a:r>
-              <a:rPr lang="en-US" smtClean="0"/>
+              <a:rPr lang="en-US"/>
               <a:t>Click icon to add picture</a:t>
             </a:r>
             <a:endParaRPr lang="en-US" dirty="0"/>
@@ -595,7 +595,7 @@
           <a:p>
             <a:pPr lvl="0"/>
             <a:r>
-              <a:rPr lang="en-US" smtClean="0"/>
+              <a:rPr lang="en-US"/>
               <a:t>Click to edit Master text styles</a:t>
             </a:r>
           </a:p>
@@ -618,7 +618,7 @@
           <a:p>
             <a:fld id="{64BF311C-CCA0-4B11-AF0A-CF55FF4C099E}" type="datetimeFigureOut">
               <a:rPr lang="en-US" smtClean="0"/>
-              <a:t>12/16/2015</a:t>
+              <a:t>7/22/2016</a:t>
             </a:fld>
             <a:endParaRPr lang="en-US"/>
           </a:p>
@@ -723,7 +723,7 @@
           </a:lstStyle>
           <a:p>
             <a:r>
-              <a:rPr lang="en-US" smtClean="0"/>
+              <a:rPr lang="en-US"/>
               <a:t>Click to edit Master title style</a:t>
             </a:r>
             <a:endParaRPr lang="en-US" dirty="0"/>
@@ -854,7 +854,7 @@
           <a:p>
             <a:pPr lvl="0"/>
             <a:r>
-              <a:rPr lang="en-US" smtClean="0"/>
+              <a:rPr lang="en-US"/>
               <a:t>Click to edit Master text styles</a:t>
             </a:r>
           </a:p>
@@ -877,7 +877,7 @@
           <a:p>
             <a:fld id="{64BF311C-CCA0-4B11-AF0A-CF55FF4C099E}" type="datetimeFigureOut">
               <a:rPr lang="en-US" smtClean="0"/>
-              <a:t>12/16/2015</a:t>
+              <a:t>7/22/2016</a:t>
             </a:fld>
             <a:endParaRPr lang="en-US"/>
           </a:p>
@@ -1216,7 +1216,7 @@
           </a:lstStyle>
           <a:p>
             <a:r>
-              <a:rPr lang="en-US" smtClean="0"/>
+              <a:rPr lang="en-US"/>
               <a:t>Click to edit Master title style</a:t>
             </a:r>
             <a:endParaRPr lang="en-US" dirty="0"/>
@@ -1271,7 +1271,7 @@
           <a:p>
             <a:pPr lvl="0"/>
             <a:r>
-              <a:rPr lang="en-US" smtClean="0"/>
+              <a:rPr lang="en-US"/>
               <a:t>Click to edit Master text styles</a:t>
             </a:r>
           </a:p>
@@ -1323,7 +1323,7 @@
               <a:buNone/>
             </a:pPr>
             <a:r>
-              <a:rPr lang="en-US" smtClean="0"/>
+              <a:rPr lang="en-US"/>
               <a:t>Click to edit Master text styles</a:t>
             </a:r>
           </a:p>
@@ -1346,7 +1346,7 @@
           <a:p>
             <a:fld id="{64BF311C-CCA0-4B11-AF0A-CF55FF4C099E}" type="datetimeFigureOut">
               <a:rPr lang="en-US" smtClean="0"/>
-              <a:t>12/16/2015</a:t>
+              <a:t>7/22/2016</a:t>
             </a:fld>
             <a:endParaRPr lang="en-US"/>
           </a:p>
@@ -1451,7 +1451,7 @@
           </a:lstStyle>
           <a:p>
             <a:r>
-              <a:rPr lang="en-US" smtClean="0"/>
+              <a:rPr lang="en-US"/>
               <a:t>Click to edit Master title style</a:t>
             </a:r>
             <a:endParaRPr lang="en-US" dirty="0"/>
@@ -1503,7 +1503,7 @@
               <a:buNone/>
             </a:pPr>
             <a:r>
-              <a:rPr lang="en-US" smtClean="0"/>
+              <a:rPr lang="en-US"/>
               <a:t>Click to edit Master text styles</a:t>
             </a:r>
           </a:p>
@@ -1526,7 +1526,7 @@
           <a:p>
             <a:fld id="{64BF311C-CCA0-4B11-AF0A-CF55FF4C099E}" type="datetimeFigureOut">
               <a:rPr lang="en-US" smtClean="0"/>
-              <a:t>12/16/2015</a:t>
+              <a:t>7/22/2016</a:t>
             </a:fld>
             <a:endParaRPr lang="en-US"/>
           </a:p>
@@ -1876,7 +1876,7 @@
           </a:lstStyle>
           <a:p>
             <a:r>
-              <a:rPr lang="en-US" smtClean="0"/>
+              <a:rPr lang="en-US"/>
               <a:t>Click to edit Master title style</a:t>
             </a:r>
             <a:endParaRPr lang="en-US" dirty="0"/>
@@ -1949,7 +1949,7 @@
               <a:buNone/>
             </a:pPr>
             <a:r>
-              <a:rPr lang="en-US" smtClean="0"/>
+              <a:rPr lang="en-US"/>
               <a:t>Click to edit Master text styles</a:t>
             </a:r>
           </a:p>
@@ -2079,7 +2079,7 @@
           <a:p>
             <a:pPr lvl="0"/>
             <a:r>
-              <a:rPr lang="en-US" smtClean="0"/>
+              <a:rPr lang="en-US"/>
               <a:t>Click to edit Master text styles</a:t>
             </a:r>
           </a:p>
@@ -2102,7 +2102,7 @@
           <a:p>
             <a:fld id="{64BF311C-CCA0-4B11-AF0A-CF55FF4C099E}" type="datetimeFigureOut">
               <a:rPr lang="en-US" smtClean="0"/>
-              <a:t>12/16/2015</a:t>
+              <a:t>7/22/2016</a:t>
             </a:fld>
             <a:endParaRPr lang="en-US"/>
           </a:p>
@@ -2208,7 +2208,7 @@
           <a:p>
             <a:pPr marL="0" lvl="0"/>
             <a:r>
-              <a:rPr lang="en-US" smtClean="0"/>
+              <a:rPr lang="en-US"/>
               <a:t>Click to edit Master title style</a:t>
             </a:r>
             <a:endParaRPr lang="en-US" dirty="0"/>
@@ -2281,7 +2281,7 @@
               <a:buNone/>
             </a:pPr>
             <a:r>
-              <a:rPr lang="en-US" smtClean="0"/>
+              <a:rPr lang="en-US"/>
               <a:t>Click to edit Master text styles</a:t>
             </a:r>
           </a:p>
@@ -2411,7 +2411,7 @@
           <a:p>
             <a:pPr lvl="0"/>
             <a:r>
-              <a:rPr lang="en-US" smtClean="0"/>
+              <a:rPr lang="en-US"/>
               <a:t>Click to edit Master text styles</a:t>
             </a:r>
           </a:p>
@@ -2434,7 +2434,7 @@
           <a:p>
             <a:fld id="{64BF311C-CCA0-4B11-AF0A-CF55FF4C099E}" type="datetimeFigureOut">
               <a:rPr lang="en-US" smtClean="0"/>
-              <a:t>12/16/2015</a:t>
+              <a:t>7/22/2016</a:t>
             </a:fld>
             <a:endParaRPr lang="en-US"/>
           </a:p>
@@ -2533,7 +2533,7 @@
           <a:lstStyle/>
           <a:p>
             <a:r>
-              <a:rPr lang="en-US" smtClean="0"/>
+              <a:rPr lang="en-US"/>
               <a:t>Click to edit Master title style</a:t>
             </a:r>
             <a:endParaRPr lang="en-US" dirty="0"/>
@@ -2557,35 +2557,35 @@
           <a:p>
             <a:pPr lvl="0"/>
             <a:r>
-              <a:rPr lang="en-US" smtClean="0"/>
+              <a:rPr lang="en-US"/>
               <a:t>Click to edit Master text styles</a:t>
             </a:r>
           </a:p>
           <a:p>
             <a:pPr lvl="1"/>
             <a:r>
-              <a:rPr lang="en-US" smtClean="0"/>
+              <a:rPr lang="en-US"/>
               <a:t>Second level</a:t>
             </a:r>
           </a:p>
           <a:p>
             <a:pPr lvl="2"/>
             <a:r>
-              <a:rPr lang="en-US" smtClean="0"/>
+              <a:rPr lang="en-US"/>
               <a:t>Third level</a:t>
             </a:r>
           </a:p>
           <a:p>
             <a:pPr lvl="3"/>
             <a:r>
-              <a:rPr lang="en-US" smtClean="0"/>
+              <a:rPr lang="en-US"/>
               <a:t>Fourth level</a:t>
             </a:r>
           </a:p>
           <a:p>
             <a:pPr lvl="4"/>
             <a:r>
-              <a:rPr lang="en-US" smtClean="0"/>
+              <a:rPr lang="en-US"/>
               <a:t>Fifth level</a:t>
             </a:r>
             <a:endParaRPr lang="en-US" dirty="0"/>
@@ -2609,7 +2609,7 @@
           <a:p>
             <a:fld id="{64BF311C-CCA0-4B11-AF0A-CF55FF4C099E}" type="datetimeFigureOut">
               <a:rPr lang="en-US" smtClean="0"/>
-              <a:t>12/16/2015</a:t>
+              <a:t>7/22/2016</a:t>
             </a:fld>
             <a:endParaRPr lang="en-US"/>
           </a:p>
@@ -2708,7 +2708,7 @@
           <a:lstStyle/>
           <a:p>
             <a:r>
-              <a:rPr lang="en-US" smtClean="0"/>
+              <a:rPr lang="en-US"/>
               <a:t>Click to edit Master title style</a:t>
             </a:r>
             <a:endParaRPr lang="en-US" dirty="0"/>
@@ -2737,35 +2737,35 @@
           <a:p>
             <a:pPr lvl="0"/>
             <a:r>
-              <a:rPr lang="en-US" smtClean="0"/>
+              <a:rPr lang="en-US"/>
               <a:t>Click to edit Master text styles</a:t>
             </a:r>
           </a:p>
           <a:p>
             <a:pPr lvl="1"/>
             <a:r>
-              <a:rPr lang="en-US" smtClean="0"/>
+              <a:rPr lang="en-US"/>
               <a:t>Second level</a:t>
             </a:r>
           </a:p>
           <a:p>
             <a:pPr lvl="2"/>
             <a:r>
-              <a:rPr lang="en-US" smtClean="0"/>
+              <a:rPr lang="en-US"/>
               <a:t>Third level</a:t>
             </a:r>
           </a:p>
           <a:p>
             <a:pPr lvl="3"/>
             <a:r>
-              <a:rPr lang="en-US" smtClean="0"/>
+              <a:rPr lang="en-US"/>
               <a:t>Fourth level</a:t>
             </a:r>
           </a:p>
           <a:p>
             <a:pPr lvl="4"/>
             <a:r>
-              <a:rPr lang="en-US" smtClean="0"/>
+              <a:rPr lang="en-US"/>
               <a:t>Fifth level</a:t>
             </a:r>
             <a:endParaRPr lang="en-US" dirty="0"/>
@@ -2789,7 +2789,7 @@
           <a:p>
             <a:fld id="{64BF311C-CCA0-4B11-AF0A-CF55FF4C099E}" type="datetimeFigureOut">
               <a:rPr lang="en-US" smtClean="0"/>
-              <a:t>12/16/2015</a:t>
+              <a:t>7/22/2016</a:t>
             </a:fld>
             <a:endParaRPr lang="en-US"/>
           </a:p>
@@ -2883,7 +2883,7 @@
           <a:lstStyle/>
           <a:p>
             <a:r>
-              <a:rPr lang="en-US" smtClean="0"/>
+              <a:rPr lang="en-US"/>
               <a:t>Click to edit Master title style</a:t>
             </a:r>
             <a:endParaRPr lang="en-US" dirty="0"/>
@@ -2907,35 +2907,35 @@
           <a:p>
             <a:pPr lvl="0"/>
             <a:r>
-              <a:rPr lang="en-US" smtClean="0"/>
+              <a:rPr lang="en-US"/>
               <a:t>Click to edit Master text styles</a:t>
             </a:r>
           </a:p>
           <a:p>
             <a:pPr lvl="1"/>
             <a:r>
-              <a:rPr lang="en-US" smtClean="0"/>
+              <a:rPr lang="en-US"/>
               <a:t>Second level</a:t>
             </a:r>
           </a:p>
           <a:p>
             <a:pPr lvl="2"/>
             <a:r>
-              <a:rPr lang="en-US" smtClean="0"/>
+              <a:rPr lang="en-US"/>
               <a:t>Third level</a:t>
             </a:r>
           </a:p>
           <a:p>
             <a:pPr lvl="3"/>
             <a:r>
-              <a:rPr lang="en-US" smtClean="0"/>
+              <a:rPr lang="en-US"/>
               <a:t>Fourth level</a:t>
             </a:r>
           </a:p>
           <a:p>
             <a:pPr lvl="4"/>
             <a:r>
-              <a:rPr lang="en-US" smtClean="0"/>
+              <a:rPr lang="en-US"/>
               <a:t>Fifth level</a:t>
             </a:r>
             <a:endParaRPr lang="en-US" dirty="0"/>
@@ -2959,7 +2959,7 @@
           <a:p>
             <a:fld id="{64BF311C-CCA0-4B11-AF0A-CF55FF4C099E}" type="datetimeFigureOut">
               <a:rPr lang="en-US" smtClean="0"/>
-              <a:t>12/16/2015</a:t>
+              <a:t>7/22/2016</a:t>
             </a:fld>
             <a:endParaRPr lang="en-US"/>
           </a:p>
@@ -3062,7 +3062,7 @@
           </a:lstStyle>
           <a:p>
             <a:r>
-              <a:rPr lang="en-US" smtClean="0"/>
+              <a:rPr lang="en-US"/>
               <a:t>Click to edit Master title style</a:t>
             </a:r>
             <a:endParaRPr lang="en-US" dirty="0"/>
@@ -3193,7 +3193,7 @@
           <a:p>
             <a:pPr lvl="0"/>
             <a:r>
-              <a:rPr lang="en-US" smtClean="0"/>
+              <a:rPr lang="en-US"/>
               <a:t>Click to edit Master text styles</a:t>
             </a:r>
           </a:p>
@@ -3216,7 +3216,7 @@
           <a:p>
             <a:fld id="{64BF311C-CCA0-4B11-AF0A-CF55FF4C099E}" type="datetimeFigureOut">
               <a:rPr lang="en-US" smtClean="0"/>
-              <a:t>12/16/2015</a:t>
+              <a:t>7/22/2016</a:t>
             </a:fld>
             <a:endParaRPr lang="en-US"/>
           </a:p>
@@ -3310,7 +3310,7 @@
           <a:lstStyle/>
           <a:p>
             <a:r>
-              <a:rPr lang="en-US" smtClean="0"/>
+              <a:rPr lang="en-US"/>
               <a:t>Click to edit Master title style</a:t>
             </a:r>
             <a:endParaRPr lang="en-US" dirty="0"/>
@@ -3369,35 +3369,35 @@
           <a:p>
             <a:pPr lvl="0"/>
             <a:r>
-              <a:rPr lang="en-US" smtClean="0"/>
+              <a:rPr lang="en-US"/>
               <a:t>Click to edit Master text styles</a:t>
             </a:r>
           </a:p>
           <a:p>
             <a:pPr lvl="1"/>
             <a:r>
-              <a:rPr lang="en-US" smtClean="0"/>
+              <a:rPr lang="en-US"/>
               <a:t>Second level</a:t>
             </a:r>
           </a:p>
           <a:p>
             <a:pPr lvl="2"/>
             <a:r>
-              <a:rPr lang="en-US" smtClean="0"/>
+              <a:rPr lang="en-US"/>
               <a:t>Third level</a:t>
             </a:r>
           </a:p>
           <a:p>
             <a:pPr lvl="3"/>
             <a:r>
-              <a:rPr lang="en-US" smtClean="0"/>
+              <a:rPr lang="en-US"/>
               <a:t>Fourth level</a:t>
             </a:r>
           </a:p>
           <a:p>
             <a:pPr lvl="4"/>
             <a:r>
-              <a:rPr lang="en-US" smtClean="0"/>
+              <a:rPr lang="en-US"/>
               <a:t>Fifth level</a:t>
             </a:r>
             <a:endParaRPr lang="en-US" dirty="0"/>
@@ -3456,35 +3456,35 @@
           <a:p>
             <a:pPr lvl="0"/>
             <a:r>
-              <a:rPr lang="en-US" smtClean="0"/>
+              <a:rPr lang="en-US"/>
               <a:t>Click to edit Master text styles</a:t>
             </a:r>
           </a:p>
           <a:p>
             <a:pPr lvl="1"/>
             <a:r>
-              <a:rPr lang="en-US" smtClean="0"/>
+              <a:rPr lang="en-US"/>
               <a:t>Second level</a:t>
             </a:r>
           </a:p>
           <a:p>
             <a:pPr lvl="2"/>
             <a:r>
-              <a:rPr lang="en-US" smtClean="0"/>
+              <a:rPr lang="en-US"/>
               <a:t>Third level</a:t>
             </a:r>
           </a:p>
           <a:p>
             <a:pPr lvl="3"/>
             <a:r>
-              <a:rPr lang="en-US" smtClean="0"/>
+              <a:rPr lang="en-US"/>
               <a:t>Fourth level</a:t>
             </a:r>
           </a:p>
           <a:p>
             <a:pPr lvl="4"/>
             <a:r>
-              <a:rPr lang="en-US" smtClean="0"/>
+              <a:rPr lang="en-US"/>
               <a:t>Fifth level</a:t>
             </a:r>
             <a:endParaRPr lang="en-US" dirty="0"/>
@@ -3508,7 +3508,7 @@
           <a:p>
             <a:fld id="{64BF311C-CCA0-4B11-AF0A-CF55FF4C099E}" type="datetimeFigureOut">
               <a:rPr lang="en-US" smtClean="0"/>
-              <a:t>12/16/2015</a:t>
+              <a:t>7/22/2016</a:t>
             </a:fld>
             <a:endParaRPr lang="en-US"/>
           </a:p>
@@ -3606,7 +3606,7 @@
           </a:lstStyle>
           <a:p>
             <a:r>
-              <a:rPr lang="en-US" smtClean="0"/>
+              <a:rPr lang="en-US"/>
               <a:t>Click to edit Master title style</a:t>
             </a:r>
             <a:endParaRPr lang="en-US" dirty="0"/>
@@ -3674,7 +3674,7 @@
           <a:p>
             <a:pPr lvl="0"/>
             <a:r>
-              <a:rPr lang="en-US" smtClean="0"/>
+              <a:rPr lang="en-US"/>
               <a:t>Click to edit Master text styles</a:t>
             </a:r>
           </a:p>
@@ -3732,35 +3732,35 @@
           <a:p>
             <a:pPr lvl="0"/>
             <a:r>
-              <a:rPr lang="en-US" smtClean="0"/>
+              <a:rPr lang="en-US"/>
               <a:t>Click to edit Master text styles</a:t>
             </a:r>
           </a:p>
           <a:p>
             <a:pPr lvl="1"/>
             <a:r>
-              <a:rPr lang="en-US" smtClean="0"/>
+              <a:rPr lang="en-US"/>
               <a:t>Second level</a:t>
             </a:r>
           </a:p>
           <a:p>
             <a:pPr lvl="2"/>
             <a:r>
-              <a:rPr lang="en-US" smtClean="0"/>
+              <a:rPr lang="en-US"/>
               <a:t>Third level</a:t>
             </a:r>
           </a:p>
           <a:p>
             <a:pPr lvl="3"/>
             <a:r>
-              <a:rPr lang="en-US" smtClean="0"/>
+              <a:rPr lang="en-US"/>
               <a:t>Fourth level</a:t>
             </a:r>
           </a:p>
           <a:p>
             <a:pPr lvl="4"/>
             <a:r>
-              <a:rPr lang="en-US" smtClean="0"/>
+              <a:rPr lang="en-US"/>
               <a:t>Fifth level</a:t>
             </a:r>
             <a:endParaRPr lang="en-US" dirty="0"/>
@@ -3828,7 +3828,7 @@
           <a:p>
             <a:pPr lvl="0"/>
             <a:r>
-              <a:rPr lang="en-US" smtClean="0"/>
+              <a:rPr lang="en-US"/>
               <a:t>Click to edit Master text styles</a:t>
             </a:r>
           </a:p>
@@ -3886,35 +3886,35 @@
           <a:p>
             <a:pPr lvl="0"/>
             <a:r>
-              <a:rPr lang="en-US" smtClean="0"/>
+              <a:rPr lang="en-US"/>
               <a:t>Click to edit Master text styles</a:t>
             </a:r>
           </a:p>
           <a:p>
             <a:pPr lvl="1"/>
             <a:r>
-              <a:rPr lang="en-US" smtClean="0"/>
+              <a:rPr lang="en-US"/>
               <a:t>Second level</a:t>
             </a:r>
           </a:p>
           <a:p>
             <a:pPr lvl="2"/>
             <a:r>
-              <a:rPr lang="en-US" smtClean="0"/>
+              <a:rPr lang="en-US"/>
               <a:t>Third level</a:t>
             </a:r>
           </a:p>
           <a:p>
             <a:pPr lvl="3"/>
             <a:r>
-              <a:rPr lang="en-US" smtClean="0"/>
+              <a:rPr lang="en-US"/>
               <a:t>Fourth level</a:t>
             </a:r>
           </a:p>
           <a:p>
             <a:pPr lvl="4"/>
             <a:r>
-              <a:rPr lang="en-US" smtClean="0"/>
+              <a:rPr lang="en-US"/>
               <a:t>Fifth level</a:t>
             </a:r>
             <a:endParaRPr lang="en-US" dirty="0"/>
@@ -3938,7 +3938,7 @@
           <a:p>
             <a:fld id="{64BF311C-CCA0-4B11-AF0A-CF55FF4C099E}" type="datetimeFigureOut">
               <a:rPr lang="en-US" smtClean="0"/>
-              <a:t>12/16/2015</a:t>
+              <a:t>7/22/2016</a:t>
             </a:fld>
             <a:endParaRPr lang="en-US"/>
           </a:p>
@@ -4032,7 +4032,7 @@
           <a:lstStyle/>
           <a:p>
             <a:r>
-              <a:rPr lang="en-US" smtClean="0"/>
+              <a:rPr lang="en-US"/>
               <a:t>Click to edit Master title style</a:t>
             </a:r>
             <a:endParaRPr lang="en-US" dirty="0"/>
@@ -4056,7 +4056,7 @@
           <a:p>
             <a:fld id="{64BF311C-CCA0-4B11-AF0A-CF55FF4C099E}" type="datetimeFigureOut">
               <a:rPr lang="en-US" smtClean="0"/>
-              <a:t>12/16/2015</a:t>
+              <a:t>7/22/2016</a:t>
             </a:fld>
             <a:endParaRPr lang="en-US"/>
           </a:p>
@@ -4151,7 +4151,7 @@
           <a:p>
             <a:fld id="{64BF311C-CCA0-4B11-AF0A-CF55FF4C099E}" type="datetimeFigureOut">
               <a:rPr lang="en-US" smtClean="0"/>
-              <a:t>12/16/2015</a:t>
+              <a:t>7/22/2016</a:t>
             </a:fld>
             <a:endParaRPr lang="en-US"/>
           </a:p>
@@ -4256,7 +4256,7 @@
           </a:lstStyle>
           <a:p>
             <a:r>
-              <a:rPr lang="en-US" smtClean="0"/>
+              <a:rPr lang="en-US"/>
               <a:t>Click to edit Master title style</a:t>
             </a:r>
             <a:endParaRPr lang="en-US" dirty="0"/>
@@ -4315,35 +4315,35 @@
           <a:p>
             <a:pPr lvl="0"/>
             <a:r>
-              <a:rPr lang="en-US" smtClean="0"/>
+              <a:rPr lang="en-US"/>
               <a:t>Click to edit Master text styles</a:t>
             </a:r>
           </a:p>
           <a:p>
             <a:pPr lvl="1"/>
             <a:r>
-              <a:rPr lang="en-US" smtClean="0"/>
+              <a:rPr lang="en-US"/>
               <a:t>Second level</a:t>
             </a:r>
           </a:p>
           <a:p>
             <a:pPr lvl="2"/>
             <a:r>
-              <a:rPr lang="en-US" smtClean="0"/>
+              <a:rPr lang="en-US"/>
               <a:t>Third level</a:t>
             </a:r>
           </a:p>
           <a:p>
             <a:pPr lvl="3"/>
             <a:r>
-              <a:rPr lang="en-US" smtClean="0"/>
+              <a:rPr lang="en-US"/>
               <a:t>Fourth level</a:t>
             </a:r>
           </a:p>
           <a:p>
             <a:pPr lvl="4"/>
             <a:r>
-              <a:rPr lang="en-US" smtClean="0"/>
+              <a:rPr lang="en-US"/>
               <a:t>Fifth level</a:t>
             </a:r>
             <a:endParaRPr lang="en-US" dirty="0"/>
@@ -4411,7 +4411,7 @@
           <a:p>
             <a:pPr lvl="0"/>
             <a:r>
-              <a:rPr lang="en-US" smtClean="0"/>
+              <a:rPr lang="en-US"/>
               <a:t>Click to edit Master text styles</a:t>
             </a:r>
           </a:p>
@@ -4434,7 +4434,7 @@
           <a:p>
             <a:fld id="{64BF311C-CCA0-4B11-AF0A-CF55FF4C099E}" type="datetimeFigureOut">
               <a:rPr lang="en-US" smtClean="0"/>
-              <a:t>12/16/2015</a:t>
+              <a:t>7/22/2016</a:t>
             </a:fld>
             <a:endParaRPr lang="en-US"/>
           </a:p>
@@ -4539,7 +4539,7 @@
           </a:lstStyle>
           <a:p>
             <a:r>
-              <a:rPr lang="en-US" smtClean="0"/>
+              <a:rPr lang="en-US"/>
               <a:t>Click to edit Master title style</a:t>
             </a:r>
             <a:endParaRPr lang="en-US" dirty="0"/>
@@ -4629,7 +4629,7 @@
           </a:lstStyle>
           <a:p>
             <a:r>
-              <a:rPr lang="en-US" smtClean="0"/>
+              <a:rPr lang="en-US"/>
               <a:t>Click icon to add picture</a:t>
             </a:r>
             <a:endParaRPr lang="en-US" dirty="0"/>
@@ -4697,7 +4697,7 @@
           <a:p>
             <a:pPr lvl="0"/>
             <a:r>
-              <a:rPr lang="en-US" smtClean="0"/>
+              <a:rPr lang="en-US"/>
               <a:t>Click to edit Master text styles</a:t>
             </a:r>
           </a:p>
@@ -4725,7 +4725,7 @@
           <a:p>
             <a:fld id="{64BF311C-CCA0-4B11-AF0A-CF55FF4C099E}" type="datetimeFigureOut">
               <a:rPr lang="en-US" smtClean="0"/>
-              <a:t>12/16/2015</a:t>
+              <a:t>7/22/2016</a:t>
             </a:fld>
             <a:endParaRPr lang="en-US"/>
           </a:p>
@@ -4844,7 +4844,7 @@
           <a:lstStyle/>
           <a:p>
             <a:r>
-              <a:rPr lang="en-US" smtClean="0"/>
+              <a:rPr lang="en-US"/>
               <a:t>Click to edit Master title style</a:t>
             </a:r>
             <a:endParaRPr lang="en-US" dirty="0"/>
@@ -4878,35 +4878,35 @@
           <a:p>
             <a:pPr lvl="0"/>
             <a:r>
-              <a:rPr lang="en-US" smtClean="0"/>
+              <a:rPr lang="en-US"/>
               <a:t>Click to edit Master text styles</a:t>
             </a:r>
           </a:p>
           <a:p>
             <a:pPr lvl="1"/>
             <a:r>
-              <a:rPr lang="en-US" smtClean="0"/>
+              <a:rPr lang="en-US"/>
               <a:t>Second level</a:t>
             </a:r>
           </a:p>
           <a:p>
             <a:pPr lvl="2"/>
             <a:r>
-              <a:rPr lang="en-US" smtClean="0"/>
+              <a:rPr lang="en-US"/>
               <a:t>Third level</a:t>
             </a:r>
           </a:p>
           <a:p>
             <a:pPr lvl="3"/>
             <a:r>
-              <a:rPr lang="en-US" smtClean="0"/>
+              <a:rPr lang="en-US"/>
               <a:t>Fourth level</a:t>
             </a:r>
           </a:p>
           <a:p>
             <a:pPr lvl="4"/>
             <a:r>
-              <a:rPr lang="en-US" smtClean="0"/>
+              <a:rPr lang="en-US"/>
               <a:t>Fifth level</a:t>
             </a:r>
             <a:endParaRPr lang="en-US" dirty="0"/>
@@ -4956,7 +4956,7 @@
           <a:p>
             <a:fld id="{64BF311C-CCA0-4B11-AF0A-CF55FF4C099E}" type="datetimeFigureOut">
               <a:rPr lang="en-US" smtClean="0"/>
-              <a:t>12/16/2015</a:t>
+              <a:t>7/22/2016</a:t>
             </a:fld>
             <a:endParaRPr lang="en-US"/>
           </a:p>
@@ -5741,10 +5741,9 @@
           <a:lstStyle/>
           <a:p>
             <a:r>
-              <a:rPr lang="en-US" dirty="0" smtClean="0"/>
+              <a:rPr lang="en-US" dirty="0"/>
               <a:t>Coalesce Diagrams</a:t>
             </a:r>
-            <a:endParaRPr lang="en-US" dirty="0"/>
           </a:p>
         </p:txBody>
       </p:sp>
@@ -5832,10 +5831,9 @@
           <a:p>
             <a:pPr algn="ctr"/>
             <a:r>
-              <a:rPr lang="en-US" dirty="0" smtClean="0"/>
+              <a:rPr lang="en-US" dirty="0"/>
               <a:t>SQL Server Database</a:t>
             </a:r>
-            <a:endParaRPr lang="en-US" dirty="0"/>
           </a:p>
         </p:txBody>
       </p:sp>
@@ -5874,10 +5872,9 @@
           <a:p>
             <a:pPr algn="ctr"/>
             <a:r>
-              <a:rPr lang="en-US" dirty="0" smtClean="0"/>
+              <a:rPr lang="en-US" dirty="0"/>
               <a:t>C# Entity Framework Data Context</a:t>
             </a:r>
-            <a:endParaRPr lang="en-US" dirty="0"/>
           </a:p>
         </p:txBody>
       </p:sp>
@@ -5918,10 +5915,9 @@
           <a:p>
             <a:pPr algn="ctr"/>
             <a:r>
-              <a:rPr lang="en-US" dirty="0" smtClean="0"/>
+              <a:rPr lang="en-US" dirty="0"/>
               <a:t>Class 1</a:t>
             </a:r>
-            <a:endParaRPr lang="en-US" dirty="0"/>
           </a:p>
         </p:txBody>
       </p:sp>
@@ -5962,10 +5958,9 @@
           <a:p>
             <a:pPr algn="ctr"/>
             <a:r>
-              <a:rPr lang="en-US" dirty="0" smtClean="0"/>
+              <a:rPr lang="en-US" dirty="0"/>
               <a:t>Class 2</a:t>
             </a:r>
-            <a:endParaRPr lang="en-US" dirty="0"/>
           </a:p>
         </p:txBody>
       </p:sp>
@@ -6006,10 +6001,9 @@
           <a:p>
             <a:pPr algn="ctr"/>
             <a:r>
-              <a:rPr lang="en-US" dirty="0" smtClean="0"/>
+              <a:rPr lang="en-US" dirty="0"/>
               <a:t>Class 3</a:t>
             </a:r>
-            <a:endParaRPr lang="en-US" dirty="0"/>
           </a:p>
         </p:txBody>
       </p:sp>
@@ -6050,10 +6044,9 @@
           <a:p>
             <a:pPr algn="ctr"/>
             <a:r>
-              <a:rPr lang="en-US" dirty="0" smtClean="0"/>
+              <a:rPr lang="en-US" dirty="0"/>
               <a:t>Class 4</a:t>
             </a:r>
-            <a:endParaRPr lang="en-US" dirty="0"/>
           </a:p>
         </p:txBody>
       </p:sp>
@@ -6092,10 +6085,9 @@
           <a:p>
             <a:pPr algn="ctr"/>
             <a:r>
-              <a:rPr lang="en-US" dirty="0" smtClean="0"/>
+              <a:rPr lang="en-US" dirty="0"/>
               <a:t>C# Web APIs</a:t>
             </a:r>
-            <a:endParaRPr lang="en-US" dirty="0"/>
           </a:p>
         </p:txBody>
       </p:sp>
@@ -6134,10 +6126,9 @@
           <a:p>
             <a:pPr algn="ctr"/>
             <a:r>
-              <a:rPr lang="en-US" sz="1000" dirty="0" smtClean="0"/>
+              <a:rPr lang="en-US" sz="1000" dirty="0"/>
               <a:t>API for Class 1</a:t>
             </a:r>
-            <a:endParaRPr lang="en-US" sz="1000" dirty="0"/>
           </a:p>
         </p:txBody>
       </p:sp>
@@ -6176,10 +6167,9 @@
           <a:p>
             <a:pPr algn="ctr"/>
             <a:r>
-              <a:rPr lang="en-US" sz="1000" dirty="0" smtClean="0"/>
+              <a:rPr lang="en-US" sz="1000" dirty="0"/>
               <a:t>API for Class 2</a:t>
             </a:r>
-            <a:endParaRPr lang="en-US" sz="1000" dirty="0"/>
           </a:p>
         </p:txBody>
       </p:sp>
@@ -6218,10 +6208,9 @@
           <a:p>
             <a:pPr algn="ctr"/>
             <a:r>
-              <a:rPr lang="en-US" sz="1000" dirty="0" smtClean="0"/>
+              <a:rPr lang="en-US" sz="1000" dirty="0"/>
               <a:t>API for Class 3</a:t>
             </a:r>
-            <a:endParaRPr lang="en-US" sz="1000" dirty="0"/>
           </a:p>
         </p:txBody>
       </p:sp>
@@ -6260,10 +6249,9 @@
           <a:p>
             <a:pPr algn="ctr"/>
             <a:r>
-              <a:rPr lang="en-US" sz="1000" dirty="0" smtClean="0"/>
+              <a:rPr lang="en-US" sz="1000" dirty="0"/>
               <a:t>API for Class 4</a:t>
             </a:r>
-            <a:endParaRPr lang="en-US" sz="1000" dirty="0"/>
           </a:p>
         </p:txBody>
       </p:sp>
@@ -6302,10 +6290,9 @@
           <a:p>
             <a:pPr algn="ctr"/>
             <a:r>
-              <a:rPr lang="en-US" dirty="0" smtClean="0"/>
+              <a:rPr lang="en-US" dirty="0"/>
               <a:t>Bootstrap Admin Views</a:t>
             </a:r>
-            <a:endParaRPr lang="en-US" dirty="0"/>
           </a:p>
         </p:txBody>
       </p:sp>
@@ -6344,14 +6331,13 @@
           <a:p>
             <a:pPr algn="ctr"/>
             <a:r>
-              <a:rPr lang="en-US" dirty="0" err="1" smtClean="0"/>
+              <a:rPr lang="en-US" dirty="0" err="1"/>
               <a:t>TypeScript</a:t>
             </a:r>
             <a:r>
-              <a:rPr lang="en-US" dirty="0" smtClean="0"/>
+              <a:rPr lang="en-US" dirty="0"/>
               <a:t> View Models</a:t>
             </a:r>
-            <a:endParaRPr lang="en-US" dirty="0"/>
           </a:p>
         </p:txBody>
       </p:sp>
@@ -6390,10 +6376,9 @@
           <a:p>
             <a:pPr algn="ctr"/>
             <a:r>
-              <a:rPr lang="en-US" sz="1000" dirty="0" smtClean="0"/>
+              <a:rPr lang="en-US" sz="1000" dirty="0"/>
               <a:t>VM for Class 1</a:t>
             </a:r>
-            <a:endParaRPr lang="en-US" sz="1000" dirty="0"/>
           </a:p>
         </p:txBody>
       </p:sp>
@@ -6432,10 +6417,9 @@
           <a:p>
             <a:pPr algn="ctr"/>
             <a:r>
-              <a:rPr lang="en-US" sz="1000" dirty="0" smtClean="0"/>
+              <a:rPr lang="en-US" sz="1000" dirty="0"/>
               <a:t>VM for Class 2</a:t>
             </a:r>
-            <a:endParaRPr lang="en-US" sz="1000" dirty="0"/>
           </a:p>
         </p:txBody>
       </p:sp>
@@ -6474,10 +6458,9 @@
           <a:p>
             <a:pPr algn="ctr"/>
             <a:r>
-              <a:rPr lang="en-US" sz="1000" dirty="0" smtClean="0"/>
+              <a:rPr lang="en-US" sz="1000" dirty="0"/>
               <a:t>VM for Class 3</a:t>
             </a:r>
-            <a:endParaRPr lang="en-US" sz="1000" dirty="0"/>
           </a:p>
         </p:txBody>
       </p:sp>
@@ -6516,10 +6499,9 @@
           <a:p>
             <a:pPr algn="ctr"/>
             <a:r>
-              <a:rPr lang="en-US" sz="1000" dirty="0" smtClean="0"/>
+              <a:rPr lang="en-US" sz="1000" dirty="0"/>
               <a:t>VM for Class 4</a:t>
             </a:r>
-            <a:endParaRPr lang="en-US" sz="1000" dirty="0"/>
           </a:p>
         </p:txBody>
       </p:sp>
@@ -6558,10 +6540,9 @@
           <a:p>
             <a:pPr algn="ctr"/>
             <a:r>
-              <a:rPr lang="en-US" dirty="0" smtClean="0"/>
+              <a:rPr lang="en-US" dirty="0"/>
               <a:t>                 HTML Helper Library</a:t>
             </a:r>
-            <a:endParaRPr lang="en-US" dirty="0"/>
           </a:p>
         </p:txBody>
       </p:sp>
@@ -6600,10 +6581,9 @@
           <a:p>
             <a:pPr algn="ctr"/>
             <a:r>
-              <a:rPr lang="en-US" sz="1000" dirty="0" smtClean="0"/>
+              <a:rPr lang="en-US" sz="1000" dirty="0"/>
               <a:t>Display Helpers</a:t>
             </a:r>
-            <a:endParaRPr lang="en-US" sz="1000" dirty="0"/>
           </a:p>
         </p:txBody>
       </p:sp>
@@ -6642,10 +6622,9 @@
           <a:p>
             <a:pPr algn="ctr"/>
             <a:r>
-              <a:rPr lang="en-US" sz="1000" dirty="0" smtClean="0"/>
+              <a:rPr lang="en-US" sz="1000" dirty="0"/>
               <a:t>Editor Helpers</a:t>
             </a:r>
-            <a:endParaRPr lang="en-US" sz="1000" dirty="0"/>
           </a:p>
         </p:txBody>
       </p:sp>
@@ -6684,10 +6663,9 @@
           <a:p>
             <a:pPr algn="ctr"/>
             <a:r>
-              <a:rPr lang="en-US" sz="1000" dirty="0" smtClean="0"/>
+              <a:rPr lang="en-US" sz="1000" dirty="0"/>
               <a:t>Grid Helpers</a:t>
             </a:r>
-            <a:endParaRPr lang="en-US" sz="1000" dirty="0"/>
           </a:p>
         </p:txBody>
       </p:sp>
@@ -6726,10 +6704,9 @@
           <a:p>
             <a:pPr algn="ctr"/>
             <a:r>
-              <a:rPr lang="en-US" sz="1000" dirty="0" smtClean="0"/>
+              <a:rPr lang="en-US" sz="1000" dirty="0"/>
               <a:t>Script Helpers</a:t>
             </a:r>
-            <a:endParaRPr lang="en-US" sz="1000" dirty="0"/>
           </a:p>
         </p:txBody>
       </p:sp>
@@ -6768,10 +6745,9 @@
           <a:p>
             <a:pPr algn="ctr"/>
             <a:r>
-              <a:rPr lang="en-US" sz="800" dirty="0" smtClean="0"/>
+              <a:rPr lang="en-US" sz="800" dirty="0"/>
               <a:t>View for Class 1</a:t>
             </a:r>
-            <a:endParaRPr lang="en-US" sz="800" dirty="0"/>
           </a:p>
         </p:txBody>
       </p:sp>
@@ -6810,10 +6786,9 @@
           <a:p>
             <a:pPr algn="ctr"/>
             <a:r>
-              <a:rPr lang="en-US" sz="800" dirty="0" smtClean="0"/>
-              <a:t>View for Class 1</a:t>
-            </a:r>
-            <a:endParaRPr lang="en-US" sz="800" dirty="0"/>
+              <a:rPr lang="en-US" sz="800" dirty="0"/>
+              <a:t>View for Class 2</a:t>
+            </a:r>
           </a:p>
         </p:txBody>
       </p:sp>
@@ -6852,10 +6827,9 @@
           <a:p>
             <a:pPr algn="ctr"/>
             <a:r>
-              <a:rPr lang="en-US" sz="800" dirty="0" smtClean="0"/>
-              <a:t>View for Class 1</a:t>
-            </a:r>
-            <a:endParaRPr lang="en-US" sz="800" dirty="0"/>
+              <a:rPr lang="en-US" sz="800" dirty="0"/>
+              <a:t>View for Class 3</a:t>
+            </a:r>
           </a:p>
         </p:txBody>
       </p:sp>
@@ -6894,8 +6868,12 @@
           <a:p>
             <a:pPr algn="ctr"/>
             <a:r>
-              <a:rPr lang="en-US" sz="800" dirty="0" smtClean="0"/>
-              <a:t>View for Class 1</a:t>
+              <a:rPr lang="en-US" sz="800" dirty="0"/>
+              <a:t>View for </a:t>
+            </a:r>
+            <a:r>
+              <a:rPr lang="en-US" sz="800"/>
+              <a:t>Class 4</a:t>
             </a:r>
             <a:endParaRPr lang="en-US" sz="800" dirty="0"/>
           </a:p>
@@ -6983,10 +6961,9 @@
           <a:p>
             <a:pPr algn="ctr"/>
             <a:r>
-              <a:rPr lang="en-US" dirty="0" smtClean="0"/>
+              <a:rPr lang="en-US" dirty="0"/>
               <a:t>Your Layout</a:t>
             </a:r>
-            <a:endParaRPr lang="en-US" dirty="0"/>
           </a:p>
         </p:txBody>
       </p:sp>
@@ -7027,10 +7004,9 @@
           <a:p>
             <a:pPr algn="ctr"/>
             <a:r>
-              <a:rPr lang="en-US" dirty="0" smtClean="0"/>
+              <a:rPr lang="en-US" dirty="0"/>
               <a:t>Your Styling</a:t>
             </a:r>
-            <a:endParaRPr lang="en-US" dirty="0"/>
           </a:p>
         </p:txBody>
       </p:sp>
@@ -7071,10 +7047,9 @@
           <a:p>
             <a:pPr algn="ctr"/>
             <a:r>
-              <a:rPr lang="en-US" dirty="0" smtClean="0"/>
+              <a:rPr lang="en-US" dirty="0"/>
               <a:t>Your Scripts</a:t>
             </a:r>
-            <a:endParaRPr lang="en-US" dirty="0"/>
           </a:p>
         </p:txBody>
       </p:sp>
@@ -7114,10 +7089,9 @@
           <a:lstStyle/>
           <a:p>
             <a:r>
-              <a:rPr lang="en-US" dirty="0" smtClean="0"/>
+              <a:rPr lang="en-US" dirty="0"/>
               <a:t>You Build</a:t>
             </a:r>
-            <a:endParaRPr lang="en-US" dirty="0"/>
           </a:p>
         </p:txBody>
       </p:sp>
@@ -7157,10 +7131,9 @@
           <a:lstStyle/>
           <a:p>
             <a:r>
-              <a:rPr lang="en-US" dirty="0" smtClean="0"/>
+              <a:rPr lang="en-US" dirty="0"/>
               <a:t>You Build</a:t>
             </a:r>
-            <a:endParaRPr lang="en-US" dirty="0"/>
           </a:p>
         </p:txBody>
       </p:sp>
@@ -7200,10 +7173,9 @@
           <a:lstStyle/>
           <a:p>
             <a:r>
-              <a:rPr lang="en-US" dirty="0" smtClean="0"/>
+              <a:rPr lang="en-US" dirty="0"/>
               <a:t>We Build</a:t>
             </a:r>
-            <a:endParaRPr lang="en-US" dirty="0"/>
           </a:p>
         </p:txBody>
       </p:sp>
@@ -7243,10 +7215,9 @@
           <a:lstStyle/>
           <a:p>
             <a:r>
-              <a:rPr lang="en-US" dirty="0" smtClean="0"/>
+              <a:rPr lang="en-US" dirty="0"/>
               <a:t>We Build</a:t>
             </a:r>
-            <a:endParaRPr lang="en-US" dirty="0"/>
           </a:p>
         </p:txBody>
       </p:sp>
@@ -7286,10 +7257,9 @@
           <a:lstStyle/>
           <a:p>
             <a:r>
-              <a:rPr lang="en-US" dirty="0" smtClean="0"/>
+              <a:rPr lang="en-US" dirty="0"/>
               <a:t>We Build</a:t>
             </a:r>
-            <a:endParaRPr lang="en-US" dirty="0"/>
           </a:p>
         </p:txBody>
       </p:sp>
@@ -7329,10 +7299,9 @@
           <a:lstStyle/>
           <a:p>
             <a:r>
-              <a:rPr lang="en-US" dirty="0" smtClean="0"/>
+              <a:rPr lang="en-US" dirty="0"/>
               <a:t>Comes Free</a:t>
             </a:r>
-            <a:endParaRPr lang="en-US" dirty="0"/>
           </a:p>
         </p:txBody>
       </p:sp>
@@ -7372,10 +7341,9 @@
           <a:lstStyle/>
           <a:p>
             <a:r>
-              <a:rPr lang="en-US" dirty="0" smtClean="0"/>
+              <a:rPr lang="en-US" dirty="0"/>
               <a:t>EF Generates</a:t>
             </a:r>
-            <a:endParaRPr lang="en-US" dirty="0"/>
           </a:p>
         </p:txBody>
       </p:sp>
@@ -7414,10 +7382,9 @@
           <a:p>
             <a:pPr algn="ctr"/>
             <a:r>
-              <a:rPr lang="en-US" dirty="0" smtClean="0"/>
+              <a:rPr lang="en-US" dirty="0"/>
               <a:t>Your Code</a:t>
             </a:r>
-            <a:endParaRPr lang="en-US" dirty="0"/>
           </a:p>
         </p:txBody>
       </p:sp>
@@ -7458,10 +7425,9 @@
           <a:p>
             <a:pPr algn="ctr"/>
             <a:r>
-              <a:rPr lang="en-US" sz="1200" dirty="0" smtClean="0"/>
+              <a:rPr lang="en-US" sz="1200" dirty="0"/>
               <a:t>Business Logic</a:t>
             </a:r>
-            <a:endParaRPr lang="en-US" sz="1200" dirty="0"/>
           </a:p>
         </p:txBody>
       </p:sp>
@@ -7502,10 +7468,9 @@
           <a:p>
             <a:pPr algn="ctr"/>
             <a:r>
-              <a:rPr lang="en-US" sz="1200" dirty="0" smtClean="0"/>
+              <a:rPr lang="en-US" sz="1200" dirty="0"/>
               <a:t>View Models</a:t>
             </a:r>
-            <a:endParaRPr lang="en-US" sz="1200" dirty="0"/>
           </a:p>
         </p:txBody>
       </p:sp>
@@ -7545,10 +7510,9 @@
           <a:lstStyle/>
           <a:p>
             <a:r>
-              <a:rPr lang="en-US" dirty="0" smtClean="0"/>
+              <a:rPr lang="en-US" dirty="0"/>
               <a:t>You Build</a:t>
             </a:r>
-            <a:endParaRPr lang="en-US" dirty="0"/>
           </a:p>
         </p:txBody>
       </p:sp>
@@ -7617,10 +7581,10 @@
           <a:p>
             <a:pPr algn="ctr"/>
             <a:r>
-              <a:rPr lang="en-US" dirty="0" err="1" smtClean="0"/>
+              <a:rPr lang="en-US" dirty="0" err="1"/>
               <a:t>DbContext</a:t>
             </a:r>
-            <a:endParaRPr lang="en-US" dirty="0" smtClean="0"/>
+            <a:endParaRPr lang="en-US" dirty="0"/>
           </a:p>
           <a:p>
             <a:pPr algn="ctr"/>
@@ -7636,10 +7600,9 @@
           <a:p>
             <a:pPr algn="ctr"/>
             <a:r>
-              <a:rPr lang="en-US" sz="1400" dirty="0" smtClean="0"/>
+              <a:rPr lang="en-US" sz="1400" dirty="0"/>
               <a:t>People</a:t>
             </a:r>
-            <a:endParaRPr lang="en-US" sz="1400" dirty="0"/>
           </a:p>
         </p:txBody>
       </p:sp>
@@ -7678,10 +7641,9 @@
           <a:p>
             <a:pPr algn="ctr"/>
             <a:r>
-              <a:rPr lang="en-US" dirty="0" smtClean="0"/>
+              <a:rPr lang="en-US" dirty="0"/>
               <a:t>SQL Server Database</a:t>
             </a:r>
-            <a:endParaRPr lang="en-US" dirty="0"/>
           </a:p>
         </p:txBody>
       </p:sp>
@@ -7722,17 +7684,16 @@
           <a:p>
             <a:pPr algn="ctr"/>
             <a:r>
-              <a:rPr lang="en-US" sz="1400" dirty="0" smtClean="0"/>
+              <a:rPr lang="en-US" sz="1400" dirty="0"/>
               <a:t>Person</a:t>
             </a:r>
           </a:p>
           <a:p>
             <a:pPr algn="ctr"/>
             <a:r>
-              <a:rPr lang="en-US" sz="1400" dirty="0" smtClean="0"/>
+              <a:rPr lang="en-US" sz="1400" dirty="0"/>
               <a:t>(POCO)</a:t>
             </a:r>
-            <a:endParaRPr lang="en-US" sz="1400" dirty="0" smtClean="0"/>
           </a:p>
         </p:txBody>
       </p:sp>
@@ -7773,7 +7734,7 @@
           <a:p>
             <a:pPr algn="ctr"/>
             <a:r>
-              <a:rPr lang="en-US" sz="1400" dirty="0" smtClean="0"/>
+              <a:rPr lang="en-US" sz="1400" dirty="0"/>
               <a:t>Person</a:t>
             </a:r>
           </a:p>
@@ -7814,10 +7775,10 @@
           <a:p>
             <a:pPr algn="ctr"/>
             <a:r>
-              <a:rPr lang="en-US" sz="1400" dirty="0" err="1" smtClean="0"/>
+              <a:rPr lang="en-US" sz="1400" dirty="0" err="1"/>
               <a:t>ReflectionRepository</a:t>
             </a:r>
-            <a:endParaRPr lang="en-US" sz="1400" dirty="0" smtClean="0"/>
+            <a:endParaRPr lang="en-US" sz="1400" dirty="0"/>
           </a:p>
         </p:txBody>
       </p:sp>
@@ -7856,15 +7817,15 @@
           <a:p>
             <a:pPr algn="ctr"/>
             <a:r>
-              <a:rPr lang="en-US" sz="1400" dirty="0" err="1" smtClean="0"/>
+              <a:rPr lang="en-US" sz="1400" dirty="0" err="1"/>
               <a:t>ClassViewModel</a:t>
             </a:r>
-            <a:endParaRPr lang="en-US" sz="1400" dirty="0" smtClean="0"/>
+            <a:endParaRPr lang="en-US" sz="1400" dirty="0"/>
           </a:p>
           <a:p>
             <a:pPr algn="ctr"/>
             <a:r>
-              <a:rPr lang="en-US" sz="1400" dirty="0" smtClean="0"/>
+              <a:rPr lang="en-US" sz="1400" dirty="0"/>
               <a:t>For Person</a:t>
             </a:r>
           </a:p>
@@ -7905,7 +7866,7 @@
           <a:p>
             <a:pPr algn="ctr"/>
             <a:r>
-              <a:rPr lang="en-US" sz="1400" dirty="0" smtClean="0"/>
+              <a:rPr lang="en-US" sz="1400" dirty="0"/>
               <a:t>Code Generator</a:t>
             </a:r>
           </a:p>
@@ -7946,7 +7907,7 @@
           <a:p>
             <a:pPr algn="ctr"/>
             <a:r>
-              <a:rPr lang="en-US" sz="1400" dirty="0" smtClean="0"/>
+              <a:rPr lang="en-US" sz="1400" dirty="0"/>
               <a:t>Base Classes</a:t>
             </a:r>
           </a:p>
@@ -7987,7 +7948,7 @@
           <a:p>
             <a:pPr algn="ctr"/>
             <a:r>
-              <a:rPr lang="en-US" sz="1400" dirty="0" smtClean="0"/>
+              <a:rPr lang="en-US" sz="1400" dirty="0"/>
               <a:t>Views</a:t>
             </a:r>
           </a:p>
@@ -8030,22 +7991,21 @@
           <a:p>
             <a:pPr algn="ctr"/>
             <a:r>
-              <a:rPr lang="en-US" sz="1400" dirty="0" smtClean="0"/>
+              <a:rPr lang="en-US" sz="1400" dirty="0"/>
               <a:t>Index, Editor, Docs</a:t>
             </a:r>
+          </a:p>
+          <a:p>
+            <a:pPr algn="ctr"/>
+            <a:r>
+              <a:rPr lang="en-US" sz="1400" dirty="0"/>
+              <a:t>.</a:t>
+            </a:r>
+            <a:r>
+              <a:rPr lang="en-US" sz="1400" dirty="0" err="1"/>
+              <a:t>cshtml</a:t>
+            </a:r>
             <a:endParaRPr lang="en-US" sz="1400" dirty="0"/>
-          </a:p>
-          <a:p>
-            <a:pPr algn="ctr"/>
-            <a:r>
-              <a:rPr lang="en-US" sz="1400" dirty="0" smtClean="0"/>
-              <a:t>.</a:t>
-            </a:r>
-            <a:r>
-              <a:rPr lang="en-US" sz="1400" dirty="0" err="1" smtClean="0"/>
-              <a:t>cshtml</a:t>
-            </a:r>
-            <a:endParaRPr lang="en-US" sz="1400" dirty="0" smtClean="0"/>
           </a:p>
         </p:txBody>
       </p:sp>
@@ -8084,14 +8044,14 @@
           <a:p>
             <a:pPr algn="ctr"/>
             <a:r>
-              <a:rPr lang="en-US" sz="1400" dirty="0" smtClean="0"/>
+              <a:rPr lang="en-US" sz="1400" dirty="0"/>
               <a:t>View Controller</a:t>
             </a:r>
           </a:p>
           <a:p>
             <a:pPr algn="ctr"/>
             <a:r>
-              <a:rPr lang="en-US" sz="1400" dirty="0" smtClean="0"/>
+              <a:rPr lang="en-US" sz="1400" dirty="0"/>
               <a:t> API Controller</a:t>
             </a:r>
           </a:p>
@@ -8132,7 +8092,7 @@
           <a:p>
             <a:pPr algn="ctr"/>
             <a:r>
-              <a:rPr lang="en-US" sz="1400" dirty="0" smtClean="0"/>
+              <a:rPr lang="en-US" sz="1400" dirty="0"/>
               <a:t>C# Generated Controllers</a:t>
             </a:r>
           </a:p>
@@ -8175,18 +8135,18 @@
           <a:p>
             <a:pPr algn="ctr"/>
             <a:r>
-              <a:rPr lang="en-US" sz="1400" dirty="0" smtClean="0"/>
+              <a:rPr lang="en-US" sz="1400" dirty="0"/>
               <a:t>Person</a:t>
             </a:r>
           </a:p>
           <a:p>
             <a:pPr algn="ctr"/>
             <a:r>
-              <a:rPr lang="en-US" sz="1400" dirty="0" err="1" smtClean="0"/>
+              <a:rPr lang="en-US" sz="1400" dirty="0" err="1"/>
               <a:t>Api</a:t>
             </a:r>
             <a:r>
-              <a:rPr lang="en-US" sz="1400" dirty="0" smtClean="0"/>
+              <a:rPr lang="en-US" sz="1400" dirty="0"/>
               <a:t>/Person</a:t>
             </a:r>
           </a:p>
@@ -8229,7 +8189,7 @@
           <a:p>
             <a:pPr algn="ctr"/>
             <a:r>
-              <a:rPr lang="en-US" sz="1400" dirty="0" smtClean="0"/>
+              <a:rPr lang="en-US" sz="1400" dirty="0"/>
               <a:t>Object VM, List VM, Views, APIs</a:t>
             </a:r>
           </a:p>
@@ -8270,7 +8230,7 @@
           <a:p>
             <a:pPr algn="ctr"/>
             <a:r>
-              <a:rPr lang="en-US" sz="1400" dirty="0" smtClean="0"/>
+              <a:rPr lang="en-US" sz="1400" dirty="0"/>
               <a:t>TS Generated View Models</a:t>
             </a:r>
           </a:p>
@@ -8313,17 +8273,17 @@
           <a:p>
             <a:pPr algn="ctr"/>
             <a:r>
-              <a:rPr lang="en-US" sz="1400" dirty="0" smtClean="0"/>
+              <a:rPr lang="en-US" sz="1400" dirty="0"/>
               <a:t>Person</a:t>
             </a:r>
           </a:p>
           <a:p>
             <a:pPr algn="ctr"/>
             <a:r>
-              <a:rPr lang="en-US" sz="1400" dirty="0" err="1" smtClean="0"/>
+              <a:rPr lang="en-US" sz="1400" dirty="0" err="1"/>
               <a:t>PersonList</a:t>
             </a:r>
-            <a:endParaRPr lang="en-US" sz="1400" dirty="0" smtClean="0"/>
+            <a:endParaRPr lang="en-US" sz="1400" dirty="0"/>
           </a:p>
         </p:txBody>
       </p:sp>
@@ -8362,7 +8322,7 @@
           <a:p>
             <a:pPr algn="ctr"/>
             <a:r>
-              <a:rPr lang="en-US" sz="1400" dirty="0" smtClean="0"/>
+              <a:rPr lang="en-US" sz="1400" dirty="0"/>
               <a:t>Helpers</a:t>
             </a:r>
           </a:p>
@@ -8403,14 +8363,14 @@
           <a:p>
             <a:pPr algn="ctr"/>
             <a:r>
-              <a:rPr lang="en-US" sz="1400" dirty="0" smtClean="0"/>
+              <a:rPr lang="en-US" sz="1400" dirty="0"/>
               <a:t>Display, Table,</a:t>
             </a:r>
           </a:p>
           <a:p>
             <a:pPr algn="ctr"/>
             <a:r>
-              <a:rPr lang="en-US" sz="1400" dirty="0" smtClean="0"/>
+              <a:rPr lang="en-US" sz="1400" dirty="0"/>
               <a:t>Knockout</a:t>
             </a:r>
           </a:p>
@@ -8451,7 +8411,7 @@
           <a:p>
             <a:pPr algn="ctr"/>
             <a:r>
-              <a:rPr lang="en-US" sz="1400" dirty="0" smtClean="0"/>
+              <a:rPr lang="en-US" sz="1400" dirty="0"/>
               <a:t>TS/JS Utilities</a:t>
             </a:r>
           </a:p>
@@ -8494,7 +8454,7 @@
           <a:p>
             <a:pPr algn="ctr"/>
             <a:r>
-              <a:rPr lang="en-US" sz="1400" dirty="0" smtClean="0"/>
+              <a:rPr lang="en-US" sz="1400" dirty="0"/>
               <a:t>Bindings, Utilities</a:t>
             </a:r>
           </a:p>
@@ -8535,11 +8495,11 @@
           <a:p>
             <a:pPr algn="ctr"/>
             <a:r>
-              <a:rPr lang="en-US" sz="1400" dirty="0" err="1" smtClean="0"/>
+              <a:rPr lang="en-US" sz="1400" dirty="0" err="1"/>
               <a:t>Compliled</a:t>
             </a:r>
             <a:r>
-              <a:rPr lang="en-US" sz="1400" dirty="0" smtClean="0"/>
+              <a:rPr lang="en-US" sz="1400" dirty="0"/>
               <a:t> JS</a:t>
             </a:r>
           </a:p>
@@ -8582,14 +8542,14 @@
           <a:p>
             <a:pPr algn="ctr"/>
             <a:r>
-              <a:rPr lang="en-US" sz="1400" dirty="0" smtClean="0"/>
+              <a:rPr lang="en-US" sz="1400" dirty="0"/>
               <a:t>App.js</a:t>
             </a:r>
           </a:p>
           <a:p>
             <a:pPr algn="ctr"/>
             <a:r>
-              <a:rPr lang="en-US" sz="1400" dirty="0" smtClean="0"/>
+              <a:rPr lang="en-US" sz="1400" dirty="0"/>
               <a:t>Map files</a:t>
             </a:r>
           </a:p>
@@ -8630,7 +8590,7 @@
           <a:p>
             <a:pPr algn="ctr"/>
             <a:r>
-              <a:rPr lang="en-US" dirty="0" smtClean="0"/>
+              <a:rPr lang="en-US" dirty="0"/>
               <a:t>Your App</a:t>
             </a:r>
             <a:endParaRPr lang="en-US" sz="1400" dirty="0"/>
@@ -8674,17 +8634,16 @@
           <a:p>
             <a:pPr algn="ctr"/>
             <a:r>
-              <a:rPr lang="en-US" sz="1400" dirty="0" smtClean="0"/>
+              <a:rPr lang="en-US" sz="1400" dirty="0"/>
               <a:t>Controllers</a:t>
             </a:r>
           </a:p>
           <a:p>
             <a:pPr algn="ctr"/>
             <a:r>
-              <a:rPr lang="en-US" sz="1400" dirty="0" smtClean="0"/>
+              <a:rPr lang="en-US" sz="1400" dirty="0"/>
               <a:t>View and API</a:t>
             </a:r>
-            <a:endParaRPr lang="en-US" sz="1400" dirty="0" smtClean="0"/>
           </a:p>
         </p:txBody>
       </p:sp>
@@ -8725,10 +8684,9 @@
           <a:p>
             <a:pPr algn="ctr"/>
             <a:r>
-              <a:rPr lang="en-US" sz="1400" dirty="0" smtClean="0"/>
+              <a:rPr lang="en-US" sz="1400" dirty="0"/>
               <a:t>Custom TS/JS</a:t>
             </a:r>
-            <a:endParaRPr lang="en-US" sz="1400" dirty="0" smtClean="0"/>
           </a:p>
         </p:txBody>
       </p:sp>
@@ -8769,10 +8727,9 @@
           <a:p>
             <a:pPr algn="ctr"/>
             <a:r>
-              <a:rPr lang="en-US" sz="1400" dirty="0" smtClean="0"/>
+              <a:rPr lang="en-US" sz="1400" dirty="0"/>
               <a:t>SCSS/CSS</a:t>
             </a:r>
-            <a:endParaRPr lang="en-US" sz="1400" dirty="0" smtClean="0"/>
           </a:p>
         </p:txBody>
       </p:sp>
@@ -8813,10 +8770,10 @@
           <a:p>
             <a:pPr algn="ctr"/>
             <a:r>
-              <a:rPr lang="en-US" sz="1400" smtClean="0"/>
+              <a:rPr lang="en-US" sz="1400"/>
               <a:t>Other Logic</a:t>
             </a:r>
-            <a:endParaRPr lang="en-US" sz="1400" dirty="0" smtClean="0"/>
+            <a:endParaRPr lang="en-US" sz="1400" dirty="0"/>
           </a:p>
         </p:txBody>
       </p:sp>

</xml_diff>